<commit_message>
working on lesson 10
</commit_message>
<xml_diff>
--- a/content/09-services-application-architectures.pptx
+++ b/content/09-services-application-architectures.pptx
@@ -5,25 +5,26 @@
     <p:sldMasterId id="2147483696" r:id="rId1"/>
   </p:sldMasterIdLst>
   <p:notesMasterIdLst>
-    <p:notesMasterId r:id="rId18"/>
+    <p:notesMasterId r:id="rId19"/>
   </p:notesMasterIdLst>
   <p:sldIdLst>
     <p:sldId id="297" r:id="rId2"/>
     <p:sldId id="289" r:id="rId3"/>
-    <p:sldId id="258" r:id="rId4"/>
-    <p:sldId id="298" r:id="rId5"/>
-    <p:sldId id="337" r:id="rId6"/>
-    <p:sldId id="338" r:id="rId7"/>
-    <p:sldId id="340" r:id="rId8"/>
-    <p:sldId id="305" r:id="rId9"/>
-    <p:sldId id="303" r:id="rId10"/>
-    <p:sldId id="301" r:id="rId11"/>
-    <p:sldId id="294" r:id="rId12"/>
-    <p:sldId id="291" r:id="rId13"/>
-    <p:sldId id="341" r:id="rId14"/>
-    <p:sldId id="292" r:id="rId15"/>
-    <p:sldId id="300" r:id="rId16"/>
-    <p:sldId id="283" r:id="rId17"/>
+    <p:sldId id="342" r:id="rId4"/>
+    <p:sldId id="258" r:id="rId5"/>
+    <p:sldId id="298" r:id="rId6"/>
+    <p:sldId id="337" r:id="rId7"/>
+    <p:sldId id="338" r:id="rId8"/>
+    <p:sldId id="340" r:id="rId9"/>
+    <p:sldId id="305" r:id="rId10"/>
+    <p:sldId id="303" r:id="rId11"/>
+    <p:sldId id="301" r:id="rId12"/>
+    <p:sldId id="294" r:id="rId13"/>
+    <p:sldId id="291" r:id="rId14"/>
+    <p:sldId id="341" r:id="rId15"/>
+    <p:sldId id="292" r:id="rId16"/>
+    <p:sldId id="300" r:id="rId17"/>
+    <p:sldId id="283" r:id="rId18"/>
   </p:sldIdLst>
   <p:sldSz cx="12192000" cy="6858000"/>
   <p:notesSz cx="6858000" cy="9144000"/>
@@ -129,6 +130,7 @@
           <p14:sldIdLst>
             <p14:sldId id="297"/>
             <p14:sldId id="289"/>
+            <p14:sldId id="342"/>
             <p14:sldId id="258"/>
             <p14:sldId id="298"/>
           </p14:sldIdLst>
@@ -3569,7 +3571,7 @@
           <a:p>
             <a:fld id="{7BCB8214-0E7E-4EFC-9E1C-25F6159D4170}" type="datetimeFigureOut">
               <a:rPr lang="en-US" smtClean="0"/>
-              <a:t>9/6/2018</a:t>
+              <a:t>9/16/2018</a:t>
             </a:fld>
             <a:endParaRPr lang="en-US"/>
           </a:p>
@@ -3904,7 +3906,7 @@
           <a:p>
             <a:fld id="{0112F830-31CF-4898-9DC8-86941997CB87}" type="slidenum">
               <a:rPr lang="en-US" smtClean="0"/>
-              <a:t>3</a:t>
+              <a:t>4</a:t>
             </a:fld>
             <a:endParaRPr lang="en-US"/>
           </a:p>
@@ -4052,7 +4054,7 @@
                 <a:tabLst/>
                 <a:defRPr/>
               </a:pPr>
-              <a:t>7</a:t>
+              <a:t>8</a:t>
             </a:fld>
             <a:endParaRPr kumimoji="0" lang="en-US" sz="1200" b="0" i="0" u="none" strike="noStrike" kern="1200" cap="none" spc="0" normalizeH="0" baseline="0" noProof="0">
               <a:ln>
@@ -4157,7 +4159,7 @@
           <a:p>
             <a:fld id="{E564724E-7CB4-4288-908A-97852378BB2E}" type="slidenum">
               <a:rPr lang="en-US" smtClean="0"/>
-              <a:t>8</a:t>
+              <a:t>9</a:t>
             </a:fld>
             <a:endParaRPr lang="en-US"/>
           </a:p>
@@ -4264,7 +4266,7 @@
           <a:p>
             <a:fld id="{0112F830-31CF-4898-9DC8-86941997CB87}" type="slidenum">
               <a:rPr lang="en-US" smtClean="0"/>
-              <a:t>14</a:t>
+              <a:t>15</a:t>
             </a:fld>
             <a:endParaRPr lang="en-US"/>
           </a:p>
@@ -4414,7 +4416,7 @@
           <a:p>
             <a:fld id="{C8AC65AB-5746-43EA-A59E-648FB11CA309}" type="datetimeFigureOut">
               <a:rPr lang="en-US" smtClean="0"/>
-              <a:t>9/6/2018</a:t>
+              <a:t>9/16/2018</a:t>
             </a:fld>
             <a:endParaRPr lang="en-US"/>
           </a:p>
@@ -4584,7 +4586,7 @@
           <a:p>
             <a:fld id="{C8AC65AB-5746-43EA-A59E-648FB11CA309}" type="datetimeFigureOut">
               <a:rPr lang="en-US" smtClean="0"/>
-              <a:t>9/6/2018</a:t>
+              <a:t>9/16/2018</a:t>
             </a:fld>
             <a:endParaRPr lang="en-US"/>
           </a:p>
@@ -4764,7 +4766,7 @@
           <a:p>
             <a:fld id="{C8AC65AB-5746-43EA-A59E-648FB11CA309}" type="datetimeFigureOut">
               <a:rPr lang="en-US" smtClean="0"/>
-              <a:t>9/6/2018</a:t>
+              <a:t>9/16/2018</a:t>
             </a:fld>
             <a:endParaRPr lang="en-US"/>
           </a:p>
@@ -5057,7 +5059,7 @@
           <a:p>
             <a:fld id="{00682357-D158-470D-AD20-0063E9FBD795}" type="datetime1">
               <a:rPr lang="en-US" smtClean="0"/>
-              <a:t>9/6/2018</a:t>
+              <a:t>9/16/2018</a:t>
             </a:fld>
             <a:endParaRPr lang="en-US" dirty="0"/>
           </a:p>
@@ -5510,7 +5512,7 @@
           <a:p>
             <a:fld id="{C8AC65AB-5746-43EA-A59E-648FB11CA309}" type="datetimeFigureOut">
               <a:rPr lang="en-US" smtClean="0"/>
-              <a:t>9/6/2018</a:t>
+              <a:t>9/16/2018</a:t>
             </a:fld>
             <a:endParaRPr lang="en-US"/>
           </a:p>
@@ -5755,7 +5757,7 @@
           <a:p>
             <a:fld id="{C8AC65AB-5746-43EA-A59E-648FB11CA309}" type="datetimeFigureOut">
               <a:rPr lang="en-US" smtClean="0"/>
-              <a:t>9/6/2018</a:t>
+              <a:t>9/16/2018</a:t>
             </a:fld>
             <a:endParaRPr lang="en-US"/>
           </a:p>
@@ -5992,7 +5994,7 @@
           <a:p>
             <a:fld id="{C8AC65AB-5746-43EA-A59E-648FB11CA309}" type="datetimeFigureOut">
               <a:rPr lang="en-US" smtClean="0"/>
-              <a:t>9/6/2018</a:t>
+              <a:t>9/16/2018</a:t>
             </a:fld>
             <a:endParaRPr lang="en-US"/>
           </a:p>
@@ -6368,7 +6370,7 @@
           <a:p>
             <a:fld id="{C8AC65AB-5746-43EA-A59E-648FB11CA309}" type="datetimeFigureOut">
               <a:rPr lang="en-US" smtClean="0"/>
-              <a:t>9/6/2018</a:t>
+              <a:t>9/16/2018</a:t>
             </a:fld>
             <a:endParaRPr lang="en-US"/>
           </a:p>
@@ -6491,7 +6493,7 @@
           <a:p>
             <a:fld id="{C8AC65AB-5746-43EA-A59E-648FB11CA309}" type="datetimeFigureOut">
               <a:rPr lang="en-US" smtClean="0"/>
-              <a:t>9/6/2018</a:t>
+              <a:t>9/16/2018</a:t>
             </a:fld>
             <a:endParaRPr lang="en-US"/>
           </a:p>
@@ -6586,7 +6588,7 @@
           <a:p>
             <a:fld id="{C8AC65AB-5746-43EA-A59E-648FB11CA309}" type="datetimeFigureOut">
               <a:rPr lang="en-US" smtClean="0"/>
-              <a:t>9/6/2018</a:t>
+              <a:t>9/16/2018</a:t>
             </a:fld>
             <a:endParaRPr lang="en-US"/>
           </a:p>
@@ -6863,7 +6865,7 @@
           <a:p>
             <a:fld id="{C8AC65AB-5746-43EA-A59E-648FB11CA309}" type="datetimeFigureOut">
               <a:rPr lang="en-US" smtClean="0"/>
-              <a:t>9/6/2018</a:t>
+              <a:t>9/16/2018</a:t>
             </a:fld>
             <a:endParaRPr lang="en-US"/>
           </a:p>
@@ -7120,7 +7122,7 @@
           <a:p>
             <a:fld id="{C8AC65AB-5746-43EA-A59E-648FB11CA309}" type="datetimeFigureOut">
               <a:rPr lang="en-US" smtClean="0"/>
-              <a:t>9/6/2018</a:t>
+              <a:t>9/16/2018</a:t>
             </a:fld>
             <a:endParaRPr lang="en-US"/>
           </a:p>
@@ -7333,7 +7335,7 @@
           <a:p>
             <a:fld id="{C8AC65AB-5746-43EA-A59E-648FB11CA309}" type="datetimeFigureOut">
               <a:rPr lang="en-US" smtClean="0"/>
-              <a:t>9/6/2018</a:t>
+              <a:t>9/16/2018</a:t>
             </a:fld>
             <a:endParaRPr lang="en-US"/>
           </a:p>
@@ -8066,6 +8068,176 @@
             <p:ph type="title"/>
           </p:nvPr>
         </p:nvSpPr>
+        <p:spPr>
+          <a:xfrm>
+            <a:off x="452387" y="365125"/>
+            <a:ext cx="10901413" cy="1325563"/>
+          </a:xfrm>
+        </p:spPr>
+        <p:txBody>
+          <a:bodyPr/>
+          <a:lstStyle/>
+          <a:p>
+            <a:r>
+              <a:rPr lang="en-US" dirty="0"/>
+              <a:t>Check:</a:t>
+            </a:r>
+          </a:p>
+        </p:txBody>
+      </p:sp>
+      <p:sp>
+        <p:nvSpPr>
+          <p:cNvPr id="3" name="Content Placeholder 2"/>
+          <p:cNvSpPr>
+            <a:spLocks noGrp="1"/>
+          </p:cNvSpPr>
+          <p:nvPr>
+            <p:ph idx="1"/>
+          </p:nvPr>
+        </p:nvSpPr>
+        <p:spPr>
+          <a:xfrm>
+            <a:off x="308008" y="1825625"/>
+            <a:ext cx="2849077" cy="4351338"/>
+          </a:xfrm>
+        </p:spPr>
+        <p:txBody>
+          <a:bodyPr>
+            <a:normAutofit/>
+          </a:bodyPr>
+          <a:lstStyle/>
+          <a:p>
+            <a:r>
+              <a:rPr lang="en-US" sz="2800" dirty="0"/>
+              <a:t>Example </a:t>
+            </a:r>
+            <a:r>
+              <a:rPr lang="en-US" sz="2800" dirty="0">
+                <a:sym typeface="Wingdings" panose="05000000000000000000" pitchFamily="2" charset="2"/>
+              </a:rPr>
+              <a:t></a:t>
+            </a:r>
+            <a:endParaRPr lang="en-US" sz="2800" dirty="0"/>
+          </a:p>
+          <a:p>
+            <a:r>
+              <a:rPr lang="en-US" sz="2800" dirty="0"/>
+              <a:t>Code:</a:t>
+            </a:r>
+          </a:p>
+          <a:p>
+            <a:pPr lvl="1"/>
+            <a:r>
+              <a:rPr lang="en-US" sz="2400" dirty="0"/>
+              <a:t>Presentation?</a:t>
+            </a:r>
+          </a:p>
+          <a:p>
+            <a:pPr lvl="1"/>
+            <a:r>
+              <a:rPr lang="en-US" sz="2400" dirty="0"/>
+              <a:t>Business</a:t>
+            </a:r>
+            <a:br>
+              <a:rPr lang="en-US" sz="2400" dirty="0"/>
+            </a:br>
+            <a:r>
+              <a:rPr lang="en-US" sz="2400" dirty="0"/>
+              <a:t>Logic ?</a:t>
+            </a:r>
+          </a:p>
+          <a:p>
+            <a:pPr lvl="1"/>
+            <a:r>
+              <a:rPr lang="en-US" sz="2400" dirty="0"/>
+              <a:t>Data Access? </a:t>
+            </a:r>
+          </a:p>
+          <a:p>
+            <a:r>
+              <a:rPr lang="en-US" sz="2800" dirty="0"/>
+              <a:t>Data</a:t>
+            </a:r>
+          </a:p>
+          <a:p>
+            <a:pPr lvl="1"/>
+            <a:r>
+              <a:rPr lang="en-US" sz="2400" dirty="0"/>
+              <a:t>Business Data ?</a:t>
+            </a:r>
+          </a:p>
+        </p:txBody>
+      </p:sp>
+      <p:pic>
+        <p:nvPicPr>
+          <p:cNvPr id="10" name="Picture 9"/>
+          <p:cNvPicPr>
+            <a:picLocks noChangeAspect="1"/>
+          </p:cNvPicPr>
+          <p:nvPr/>
+        </p:nvPicPr>
+        <p:blipFill>
+          <a:blip r:embed="rId2">
+            <a:extLst>
+              <a:ext uri="{28A0092B-C50C-407E-A947-70E740481C1C}">
+                <a14:useLocalDpi xmlns:a14="http://schemas.microsoft.com/office/drawing/2010/main" val="0"/>
+              </a:ext>
+            </a:extLst>
+          </a:blip>
+          <a:stretch>
+            <a:fillRect/>
+          </a:stretch>
+        </p:blipFill>
+        <p:spPr>
+          <a:xfrm>
+            <a:off x="3227673" y="109487"/>
+            <a:ext cx="8824761" cy="6618571"/>
+          </a:xfrm>
+          <a:prstGeom prst="rect">
+            <a:avLst/>
+          </a:prstGeom>
+        </p:spPr>
+      </p:pic>
+    </p:spTree>
+    <p:extLst>
+      <p:ext uri="{BB962C8B-B14F-4D97-AF65-F5344CB8AC3E}">
+        <p14:creationId xmlns:p14="http://schemas.microsoft.com/office/powerpoint/2010/main" val="3425537333"/>
+      </p:ext>
+    </p:extLst>
+  </p:cSld>
+  <p:clrMapOvr>
+    <a:masterClrMapping/>
+  </p:clrMapOvr>
+</p:sld>
+</file>
+
+<file path=ppt/slides/slide11.xml><?xml version="1.0" encoding="utf-8"?>
+<p:sld xmlns:a="http://schemas.openxmlformats.org/drawingml/2006/main" xmlns:r="http://schemas.openxmlformats.org/officeDocument/2006/relationships" xmlns:p="http://schemas.openxmlformats.org/presentationml/2006/main">
+  <p:cSld>
+    <p:spTree>
+      <p:nvGrpSpPr>
+        <p:cNvPr id="1" name=""/>
+        <p:cNvGrpSpPr/>
+        <p:nvPr/>
+      </p:nvGrpSpPr>
+      <p:grpSpPr>
+        <a:xfrm>
+          <a:off x="0" y="0"/>
+          <a:ext cx="0" cy="0"/>
+          <a:chOff x="0" y="0"/>
+          <a:chExt cx="0" cy="0"/>
+        </a:xfrm>
+      </p:grpSpPr>
+      <p:sp>
+        <p:nvSpPr>
+          <p:cNvPr id="2" name="Title 1"/>
+          <p:cNvSpPr>
+            <a:spLocks noGrp="1"/>
+          </p:cNvSpPr>
+          <p:nvPr>
+            <p:ph type="title"/>
+          </p:nvPr>
+        </p:nvSpPr>
         <p:spPr/>
         <p:txBody>
           <a:bodyPr/>
@@ -8237,7 +8409,7 @@
 </p:sld>
 </file>
 
-<file path=ppt/slides/slide11.xml><?xml version="1.0" encoding="utf-8"?>
+<file path=ppt/slides/slide12.xml><?xml version="1.0" encoding="utf-8"?>
 <p:sld xmlns:a="http://schemas.openxmlformats.org/drawingml/2006/main" xmlns:r="http://schemas.openxmlformats.org/officeDocument/2006/relationships" xmlns:p="http://schemas.openxmlformats.org/presentationml/2006/main">
   <p:cSld>
     <p:spTree>
@@ -8444,7 +8616,7 @@
 </p:sld>
 </file>
 
-<file path=ppt/slides/slide12.xml><?xml version="1.0" encoding="utf-8"?>
+<file path=ppt/slides/slide13.xml><?xml version="1.0" encoding="utf-8"?>
 <p:sld xmlns:a="http://schemas.openxmlformats.org/drawingml/2006/main" xmlns:r="http://schemas.openxmlformats.org/officeDocument/2006/relationships" xmlns:p="http://schemas.openxmlformats.org/presentationml/2006/main">
   <p:cSld>
     <p:bg>
@@ -9186,7 +9358,7 @@
 </p:sld>
 </file>
 
-<file path=ppt/slides/slide13.xml><?xml version="1.0" encoding="utf-8"?>
+<file path=ppt/slides/slide14.xml><?xml version="1.0" encoding="utf-8"?>
 <p:sld xmlns:a="http://schemas.openxmlformats.org/drawingml/2006/main" xmlns:r="http://schemas.openxmlformats.org/officeDocument/2006/relationships" xmlns:p="http://schemas.openxmlformats.org/presentationml/2006/main">
   <p:cSld>
     <p:spTree>
@@ -9317,7 +9489,7 @@
 </p:sld>
 </file>
 
-<file path=ppt/slides/slide14.xml><?xml version="1.0" encoding="utf-8"?>
+<file path=ppt/slides/slide15.xml><?xml version="1.0" encoding="utf-8"?>
 <p:sld xmlns:a="http://schemas.openxmlformats.org/drawingml/2006/main" xmlns:r="http://schemas.openxmlformats.org/officeDocument/2006/relationships" xmlns:p="http://schemas.openxmlformats.org/presentationml/2006/main">
   <p:cSld>
     <p:bg>
@@ -9809,7 +9981,7 @@
 </p:sld>
 </file>
 
-<file path=ppt/slides/slide15.xml><?xml version="1.0" encoding="utf-8"?>
+<file path=ppt/slides/slide16.xml><?xml version="1.0" encoding="utf-8"?>
 <p:sld xmlns:a="http://schemas.openxmlformats.org/drawingml/2006/main" xmlns:r="http://schemas.openxmlformats.org/officeDocument/2006/relationships" xmlns:p="http://schemas.openxmlformats.org/presentationml/2006/main">
   <p:cSld>
     <p:bg>
@@ -10255,7 +10427,7 @@
 </p:sld>
 </file>
 
-<file path=ppt/slides/slide16.xml><?xml version="1.0" encoding="utf-8"?>
+<file path=ppt/slides/slide17.xml><?xml version="1.0" encoding="utf-8"?>
 <p:sld xmlns:a="http://schemas.openxmlformats.org/drawingml/2006/main" xmlns:r="http://schemas.openxmlformats.org/officeDocument/2006/relationships" xmlns:p="http://schemas.openxmlformats.org/presentationml/2006/main">
   <p:cSld>
     <p:bg>
@@ -10864,6 +11036,164 @@
 <file path=ppt/slides/slide3.xml><?xml version="1.0" encoding="utf-8"?>
 <p:sld xmlns:a="http://schemas.openxmlformats.org/drawingml/2006/main" xmlns:r="http://schemas.openxmlformats.org/officeDocument/2006/relationships" xmlns:p="http://schemas.openxmlformats.org/presentationml/2006/main">
   <p:cSld>
+    <p:spTree>
+      <p:nvGrpSpPr>
+        <p:cNvPr id="1" name=""/>
+        <p:cNvGrpSpPr/>
+        <p:nvPr/>
+      </p:nvGrpSpPr>
+      <p:grpSpPr>
+        <a:xfrm>
+          <a:off x="0" y="0"/>
+          <a:ext cx="0" cy="0"/>
+          <a:chOff x="0" y="0"/>
+          <a:chExt cx="0" cy="0"/>
+        </a:xfrm>
+      </p:grpSpPr>
+      <p:pic>
+        <p:nvPicPr>
+          <p:cNvPr id="7" name="Graphic 6">
+            <a:extLst>
+              <a:ext uri="{FF2B5EF4-FFF2-40B4-BE49-F238E27FC236}">
+                <a16:creationId xmlns:a16="http://schemas.microsoft.com/office/drawing/2014/main" id="{CC18DA7E-9FB8-4C9B-A87D-898E8D6893A8}"/>
+              </a:ext>
+            </a:extLst>
+          </p:cNvPr>
+          <p:cNvPicPr>
+            <a:picLocks noChangeAspect="1"/>
+          </p:cNvPicPr>
+          <p:nvPr/>
+        </p:nvPicPr>
+        <p:blipFill>
+          <a:blip r:embed="rId2">
+            <a:extLst>
+              <a:ext uri="{28A0092B-C50C-407E-A947-70E740481C1C}">
+                <a14:useLocalDpi xmlns:a14="http://schemas.microsoft.com/office/drawing/2010/main" val="0"/>
+              </a:ext>
+              <a:ext uri="{96DAC541-7B7A-43D3-8B79-37D633B846F1}">
+                <asvg:svgBlip xmlns:asvg="http://schemas.microsoft.com/office/drawing/2016/SVG/main" r:embed="rId3"/>
+              </a:ext>
+            </a:extLst>
+          </a:blip>
+          <a:stretch>
+            <a:fillRect/>
+          </a:stretch>
+        </p:blipFill>
+        <p:spPr>
+          <a:xfrm>
+            <a:off x="632619" y="365125"/>
+            <a:ext cx="1119981" cy="1119981"/>
+          </a:xfrm>
+          <a:prstGeom prst="rect">
+            <a:avLst/>
+          </a:prstGeom>
+        </p:spPr>
+      </p:pic>
+      <p:sp>
+        <p:nvSpPr>
+          <p:cNvPr id="2" name="Title 1">
+            <a:extLst>
+              <a:ext uri="{FF2B5EF4-FFF2-40B4-BE49-F238E27FC236}">
+                <a16:creationId xmlns:a16="http://schemas.microsoft.com/office/drawing/2014/main" id="{47181E45-C23A-4FDF-9335-310AC4537DAD}"/>
+              </a:ext>
+            </a:extLst>
+          </p:cNvPr>
+          <p:cNvSpPr>
+            <a:spLocks noGrp="1"/>
+          </p:cNvSpPr>
+          <p:nvPr>
+            <p:ph type="title"/>
+          </p:nvPr>
+        </p:nvSpPr>
+        <p:spPr>
+          <a:xfrm>
+            <a:off x="1913468" y="365125"/>
+            <a:ext cx="9440332" cy="1325563"/>
+          </a:xfrm>
+        </p:spPr>
+        <p:txBody>
+          <a:bodyPr>
+            <a:normAutofit/>
+          </a:bodyPr>
+          <a:lstStyle/>
+          <a:p>
+            <a:r>
+              <a:rPr lang="en-US" dirty="0"/>
+              <a:t>Agenda</a:t>
+            </a:r>
+          </a:p>
+        </p:txBody>
+      </p:sp>
+      <p:sp>
+        <p:nvSpPr>
+          <p:cNvPr id="3" name="Content Placeholder 2">
+            <a:extLst>
+              <a:ext uri="{FF2B5EF4-FFF2-40B4-BE49-F238E27FC236}">
+                <a16:creationId xmlns:a16="http://schemas.microsoft.com/office/drawing/2014/main" id="{88161BE5-48BE-423F-986A-2C585BFE6C45}"/>
+              </a:ext>
+            </a:extLst>
+          </p:cNvPr>
+          <p:cNvSpPr>
+            <a:spLocks noGrp="1"/>
+          </p:cNvSpPr>
+          <p:nvPr>
+            <p:ph idx="1"/>
+          </p:nvPr>
+        </p:nvSpPr>
+        <p:spPr>
+          <a:xfrm>
+            <a:off x="838200" y="1825625"/>
+            <a:ext cx="10515600" cy="4351338"/>
+          </a:xfrm>
+        </p:spPr>
+        <p:txBody>
+          <a:bodyPr>
+            <a:normAutofit/>
+          </a:bodyPr>
+          <a:lstStyle/>
+          <a:p>
+            <a:r>
+              <a:rPr lang="en-US" dirty="0"/>
+              <a:t>Discussion</a:t>
+            </a:r>
+          </a:p>
+          <a:p>
+            <a:r>
+              <a:rPr lang="en-US" dirty="0"/>
+              <a:t>Content</a:t>
+            </a:r>
+          </a:p>
+          <a:p>
+            <a:pPr lvl="1"/>
+            <a:r>
+              <a:rPr lang="en-US" dirty="0"/>
+              <a:t>Application Architectures</a:t>
+            </a:r>
+          </a:p>
+          <a:p>
+            <a:r>
+              <a:rPr lang="en-US" dirty="0"/>
+              <a:t>Wrap-Up</a:t>
+            </a:r>
+          </a:p>
+        </p:txBody>
+      </p:sp>
+    </p:spTree>
+    <p:extLst>
+      <p:ext uri="{BB962C8B-B14F-4D97-AF65-F5344CB8AC3E}">
+        <p14:creationId xmlns:p14="http://schemas.microsoft.com/office/powerpoint/2010/main" val="593817516"/>
+      </p:ext>
+    </p:extLst>
+  </p:cSld>
+  <p:clrMapOvr>
+    <a:masterClrMapping/>
+  </p:clrMapOvr>
+</p:sld>
+</file>
+
+<file path=ppt/slides/slide4.xml><?xml version="1.0" encoding="utf-8"?>
+<p:sld xmlns:a="http://schemas.openxmlformats.org/drawingml/2006/main" xmlns:r="http://schemas.openxmlformats.org/officeDocument/2006/relationships" xmlns:p="http://schemas.openxmlformats.org/presentationml/2006/main">
+  <p:cSld>
     <p:bg>
       <p:bgPr>
         <a:solidFill>
@@ -11084,7 +11414,7 @@
 </p:sld>
 </file>
 
-<file path=ppt/slides/slide4.xml><?xml version="1.0" encoding="utf-8"?>
+<file path=ppt/slides/slide5.xml><?xml version="1.0" encoding="utf-8"?>
 <p:sld xmlns:a="http://schemas.openxmlformats.org/drawingml/2006/main" xmlns:r="http://schemas.openxmlformats.org/officeDocument/2006/relationships" xmlns:p="http://schemas.openxmlformats.org/presentationml/2006/main">
   <p:cSld>
     <p:bg>
@@ -11196,7 +11526,7 @@
 </p:sld>
 </file>
 
-<file path=ppt/slides/slide5.xml><?xml version="1.0" encoding="utf-8"?>
+<file path=ppt/slides/slide6.xml><?xml version="1.0" encoding="utf-8"?>
 <p:sld xmlns:a="http://schemas.openxmlformats.org/drawingml/2006/main" xmlns:r="http://schemas.openxmlformats.org/officeDocument/2006/relationships" xmlns:p="http://schemas.openxmlformats.org/presentationml/2006/main">
   <p:cSld>
     <p:bg>
@@ -11894,7 +12224,7 @@
 </p:sld>
 </file>
 
-<file path=ppt/slides/slide6.xml><?xml version="1.0" encoding="utf-8"?>
+<file path=ppt/slides/slide7.xml><?xml version="1.0" encoding="utf-8"?>
 <p:sld xmlns:a="http://schemas.openxmlformats.org/drawingml/2006/main" xmlns:r="http://schemas.openxmlformats.org/officeDocument/2006/relationships" xmlns:p="http://schemas.openxmlformats.org/presentationml/2006/main">
   <p:cSld>
     <p:spTree>
@@ -11973,7 +12303,7 @@
 </p:sld>
 </file>
 
-<file path=ppt/slides/slide7.xml><?xml version="1.0" encoding="utf-8"?>
+<file path=ppt/slides/slide8.xml><?xml version="1.0" encoding="utf-8"?>
 <p:sld xmlns:a="http://schemas.openxmlformats.org/drawingml/2006/main" xmlns:r="http://schemas.openxmlformats.org/officeDocument/2006/relationships" xmlns:p="http://schemas.openxmlformats.org/presentationml/2006/main">
   <p:cSld>
     <p:spTree>
@@ -12156,177 +12486,6 @@
 </p:sld>
 </file>
 
-<file path=ppt/slides/slide8.xml><?xml version="1.0" encoding="utf-8"?>
-<p:sld xmlns:a="http://schemas.openxmlformats.org/drawingml/2006/main" xmlns:r="http://schemas.openxmlformats.org/officeDocument/2006/relationships" xmlns:p="http://schemas.openxmlformats.org/presentationml/2006/main">
-  <p:cSld>
-    <p:spTree>
-      <p:nvGrpSpPr>
-        <p:cNvPr id="1" name=""/>
-        <p:cNvGrpSpPr/>
-        <p:nvPr/>
-      </p:nvGrpSpPr>
-      <p:grpSpPr>
-        <a:xfrm>
-          <a:off x="0" y="0"/>
-          <a:ext cx="0" cy="0"/>
-          <a:chOff x="0" y="0"/>
-          <a:chExt cx="0" cy="0"/>
-        </a:xfrm>
-      </p:grpSpPr>
-      <p:sp>
-        <p:nvSpPr>
-          <p:cNvPr id="9" name="Title 8">
-            <a:extLst>
-              <a:ext uri="{FF2B5EF4-FFF2-40B4-BE49-F238E27FC236}">
-                <a16:creationId xmlns:a16="http://schemas.microsoft.com/office/drawing/2014/main" id="{2E3877A3-30C9-46AB-89A0-0E392B51784B}"/>
-              </a:ext>
-            </a:extLst>
-          </p:cNvPr>
-          <p:cNvSpPr>
-            <a:spLocks noGrp="1"/>
-          </p:cNvSpPr>
-          <p:nvPr>
-            <p:ph type="title"/>
-          </p:nvPr>
-        </p:nvSpPr>
-        <p:spPr/>
-        <p:txBody>
-          <a:bodyPr>
-            <a:normAutofit/>
-          </a:bodyPr>
-          <a:lstStyle/>
-          <a:p>
-            <a:r>
-              <a:rPr lang="en-US" dirty="0"/>
-              <a:t>Components of An Application</a:t>
-            </a:r>
-          </a:p>
-        </p:txBody>
-      </p:sp>
-      <p:graphicFrame>
-        <p:nvGraphicFramePr>
-          <p:cNvPr id="12" name="Content Placeholder 9">
-            <a:extLst>
-              <a:ext uri="{FF2B5EF4-FFF2-40B4-BE49-F238E27FC236}">
-                <a16:creationId xmlns:a16="http://schemas.microsoft.com/office/drawing/2014/main" id="{6061E8B3-5DD2-4914-91C0-C3F97E119A7A}"/>
-              </a:ext>
-            </a:extLst>
-          </p:cNvPr>
-          <p:cNvGraphicFramePr>
-            <a:graphicFrameLocks noGrp="1"/>
-          </p:cNvGraphicFramePr>
-          <p:nvPr>
-            <p:ph idx="1"/>
-            <p:extLst>
-              <p:ext uri="{D42A27DB-BD31-4B8C-83A1-F6EECF244321}">
-                <p14:modId xmlns:p14="http://schemas.microsoft.com/office/powerpoint/2010/main" val="3926102518"/>
-              </p:ext>
-            </p:extLst>
-          </p:nvPr>
-        </p:nvGraphicFramePr>
-        <p:xfrm>
-          <a:off x="838200" y="1825625"/>
-          <a:ext cx="10515600" cy="4351338"/>
-        </p:xfrm>
-        <a:graphic>
-          <a:graphicData uri="http://schemas.openxmlformats.org/drawingml/2006/diagram">
-            <dgm:relIds xmlns:dgm="http://schemas.openxmlformats.org/drawingml/2006/diagram" xmlns:r="http://schemas.openxmlformats.org/officeDocument/2006/relationships" r:dm="rId3" r:lo="rId4" r:qs="rId5" r:cs="rId6"/>
-          </a:graphicData>
-        </a:graphic>
-      </p:graphicFrame>
-      <p:sp>
-        <p:nvSpPr>
-          <p:cNvPr id="6" name="Footer Placeholder 5">
-            <a:extLst>
-              <a:ext uri="{FF2B5EF4-FFF2-40B4-BE49-F238E27FC236}">
-                <a16:creationId xmlns:a16="http://schemas.microsoft.com/office/drawing/2014/main" id="{7D77497D-CF2F-4174-96E6-6561B4A875A0}"/>
-              </a:ext>
-            </a:extLst>
-          </p:cNvPr>
-          <p:cNvSpPr>
-            <a:spLocks noGrp="1"/>
-          </p:cNvSpPr>
-          <p:nvPr>
-            <p:ph type="ftr" sz="quarter" idx="11"/>
-          </p:nvPr>
-        </p:nvSpPr>
-        <p:spPr/>
-        <p:txBody>
-          <a:bodyPr>
-            <a:normAutofit/>
-          </a:bodyPr>
-          <a:lstStyle/>
-          <a:p>
-            <a:endParaRPr lang="en-US">
-              <a:solidFill>
-                <a:srgbClr val="FFFFFF"/>
-              </a:solidFill>
-            </a:endParaRPr>
-          </a:p>
-        </p:txBody>
-      </p:sp>
-      <p:sp>
-        <p:nvSpPr>
-          <p:cNvPr id="5" name="Slide Number Placeholder 4">
-            <a:extLst>
-              <a:ext uri="{FF2B5EF4-FFF2-40B4-BE49-F238E27FC236}">
-                <a16:creationId xmlns:a16="http://schemas.microsoft.com/office/drawing/2014/main" id="{05865EF1-885D-4A31-B9FB-273BE5FAB564}"/>
-              </a:ext>
-            </a:extLst>
-          </p:cNvPr>
-          <p:cNvSpPr>
-            <a:spLocks noGrp="1"/>
-          </p:cNvSpPr>
-          <p:nvPr>
-            <p:ph type="sldNum" sz="quarter" idx="12"/>
-          </p:nvPr>
-        </p:nvSpPr>
-        <p:spPr/>
-        <p:txBody>
-          <a:bodyPr>
-            <a:normAutofit/>
-          </a:bodyPr>
-          <a:lstStyle/>
-          <a:p>
-            <a:pPr>
-              <a:spcAft>
-                <a:spcPts val="600"/>
-              </a:spcAft>
-            </a:pPr>
-            <a:fld id="{56FBB80D-BC95-41F9-A723-7C4BDED58279}" type="slidenum">
-              <a:rPr lang="en-US">
-                <a:solidFill>
-                  <a:srgbClr val="FFFFFF"/>
-                </a:solidFill>
-              </a:rPr>
-              <a:pPr>
-                <a:spcAft>
-                  <a:spcPts val="600"/>
-                </a:spcAft>
-              </a:pPr>
-              <a:t>8</a:t>
-            </a:fld>
-            <a:endParaRPr lang="en-US">
-              <a:solidFill>
-                <a:srgbClr val="FFFFFF"/>
-              </a:solidFill>
-            </a:endParaRPr>
-          </a:p>
-        </p:txBody>
-      </p:sp>
-    </p:spTree>
-    <p:extLst>
-      <p:ext uri="{BB962C8B-B14F-4D97-AF65-F5344CB8AC3E}">
-        <p14:creationId xmlns:p14="http://schemas.microsoft.com/office/powerpoint/2010/main" val="1603808011"/>
-      </p:ext>
-    </p:extLst>
-  </p:cSld>
-  <p:clrMapOvr>
-    <a:masterClrMapping/>
-  </p:clrMapOvr>
-</p:sld>
-</file>
-
 <file path=ppt/slides/slide9.xml><?xml version="1.0" encoding="utf-8"?>
 <p:sld xmlns:a="http://schemas.openxmlformats.org/drawingml/2006/main" xmlns:r="http://schemas.openxmlformats.org/officeDocument/2006/relationships" xmlns:p="http://schemas.openxmlformats.org/presentationml/2006/main">
   <p:cSld>
@@ -12346,7 +12505,13 @@
       </p:grpSpPr>
       <p:sp>
         <p:nvSpPr>
-          <p:cNvPr id="2" name="Title 1"/>
+          <p:cNvPr id="9" name="Title 8">
+            <a:extLst>
+              <a:ext uri="{FF2B5EF4-FFF2-40B4-BE49-F238E27FC236}">
+                <a16:creationId xmlns:a16="http://schemas.microsoft.com/office/drawing/2014/main" id="{2E3877A3-30C9-46AB-89A0-0E392B51784B}"/>
+              </a:ext>
+            </a:extLst>
+          </p:cNvPr>
           <p:cNvSpPr>
             <a:spLocks noGrp="1"/>
           </p:cNvSpPr>
@@ -12354,39 +12519,7 @@
             <p:ph type="title"/>
           </p:nvPr>
         </p:nvSpPr>
-        <p:spPr>
-          <a:xfrm>
-            <a:off x="452387" y="365125"/>
-            <a:ext cx="10901413" cy="1325563"/>
-          </a:xfrm>
-        </p:spPr>
-        <p:txBody>
-          <a:bodyPr/>
-          <a:lstStyle/>
-          <a:p>
-            <a:r>
-              <a:rPr lang="en-US" dirty="0"/>
-              <a:t>Check:</a:t>
-            </a:r>
-          </a:p>
-        </p:txBody>
-      </p:sp>
-      <p:sp>
-        <p:nvSpPr>
-          <p:cNvPr id="3" name="Content Placeholder 2"/>
-          <p:cNvSpPr>
-            <a:spLocks noGrp="1"/>
-          </p:cNvSpPr>
-          <p:nvPr>
-            <p:ph idx="1"/>
-          </p:nvPr>
-        </p:nvSpPr>
-        <p:spPr>
-          <a:xfrm>
-            <a:off x="308008" y="1825625"/>
-            <a:ext cx="2849077" cy="4351338"/>
-          </a:xfrm>
-        </p:spPr>
+        <p:spPr/>
         <p:txBody>
           <a:bodyPr>
             <a:normAutofit/>
@@ -12394,100 +12527,127 @@
           <a:lstStyle/>
           <a:p>
             <a:r>
-              <a:rPr lang="en-US" sz="2800" dirty="0"/>
-              <a:t>Example </a:t>
-            </a:r>
-            <a:r>
-              <a:rPr lang="en-US" sz="2800" dirty="0">
-                <a:sym typeface="Wingdings" panose="05000000000000000000" pitchFamily="2" charset="2"/>
-              </a:rPr>
-              <a:t></a:t>
-            </a:r>
-            <a:endParaRPr lang="en-US" sz="2800" dirty="0"/>
-          </a:p>
-          <a:p>
-            <a:r>
-              <a:rPr lang="en-US" sz="2800" dirty="0"/>
-              <a:t>Code:</a:t>
-            </a:r>
-          </a:p>
-          <a:p>
-            <a:pPr lvl="1"/>
-            <a:r>
-              <a:rPr lang="en-US" sz="2400" dirty="0"/>
-              <a:t>Presentation?</a:t>
-            </a:r>
-          </a:p>
-          <a:p>
-            <a:pPr lvl="1"/>
-            <a:r>
-              <a:rPr lang="en-US" sz="2400" dirty="0"/>
-              <a:t>Business</a:t>
-            </a:r>
-            <a:br>
-              <a:rPr lang="en-US" sz="2400" dirty="0"/>
-            </a:br>
-            <a:r>
-              <a:rPr lang="en-US" sz="2400" dirty="0"/>
-              <a:t>Logic ?</a:t>
-            </a:r>
-          </a:p>
-          <a:p>
-            <a:pPr lvl="1"/>
-            <a:r>
-              <a:rPr lang="en-US" sz="2400" dirty="0"/>
-              <a:t>Data Access? </a:t>
-            </a:r>
-          </a:p>
-          <a:p>
-            <a:r>
-              <a:rPr lang="en-US" sz="2800" dirty="0"/>
-              <a:t>Data</a:t>
-            </a:r>
-          </a:p>
-          <a:p>
-            <a:pPr lvl="1"/>
-            <a:r>
-              <a:rPr lang="en-US" sz="2400" dirty="0"/>
-              <a:t>Business Data ?</a:t>
-            </a:r>
-          </a:p>
-        </p:txBody>
-      </p:sp>
-      <p:pic>
-        <p:nvPicPr>
-          <p:cNvPr id="10" name="Picture 9"/>
-          <p:cNvPicPr>
-            <a:picLocks noChangeAspect="1"/>
-          </p:cNvPicPr>
-          <p:nvPr/>
-        </p:nvPicPr>
-        <p:blipFill>
-          <a:blip r:embed="rId2">
+              <a:rPr lang="en-US" dirty="0"/>
+              <a:t>Components of An Application</a:t>
+            </a:r>
+          </a:p>
+        </p:txBody>
+      </p:sp>
+      <p:graphicFrame>
+        <p:nvGraphicFramePr>
+          <p:cNvPr id="12" name="Content Placeholder 9">
             <a:extLst>
-              <a:ext uri="{28A0092B-C50C-407E-A947-70E740481C1C}">
-                <a14:useLocalDpi xmlns:a14="http://schemas.microsoft.com/office/drawing/2010/main" val="0"/>
+              <a:ext uri="{FF2B5EF4-FFF2-40B4-BE49-F238E27FC236}">
+                <a16:creationId xmlns:a16="http://schemas.microsoft.com/office/drawing/2014/main" id="{6061E8B3-5DD2-4914-91C0-C3F97E119A7A}"/>
               </a:ext>
             </a:extLst>
-          </a:blip>
-          <a:stretch>
-            <a:fillRect/>
-          </a:stretch>
-        </p:blipFill>
-        <p:spPr>
-          <a:xfrm>
-            <a:off x="3227673" y="109487"/>
-            <a:ext cx="8824761" cy="6618571"/>
-          </a:xfrm>
-          <a:prstGeom prst="rect">
-            <a:avLst/>
-          </a:prstGeom>
-        </p:spPr>
-      </p:pic>
+          </p:cNvPr>
+          <p:cNvGraphicFramePr>
+            <a:graphicFrameLocks noGrp="1"/>
+          </p:cNvGraphicFramePr>
+          <p:nvPr>
+            <p:ph idx="1"/>
+            <p:extLst>
+              <p:ext uri="{D42A27DB-BD31-4B8C-83A1-F6EECF244321}">
+                <p14:modId xmlns:p14="http://schemas.microsoft.com/office/powerpoint/2010/main" val="3926102518"/>
+              </p:ext>
+            </p:extLst>
+          </p:nvPr>
+        </p:nvGraphicFramePr>
+        <p:xfrm>
+          <a:off x="838200" y="1825625"/>
+          <a:ext cx="10515600" cy="4351338"/>
+        </p:xfrm>
+        <a:graphic>
+          <a:graphicData uri="http://schemas.openxmlformats.org/drawingml/2006/diagram">
+            <dgm:relIds xmlns:dgm="http://schemas.openxmlformats.org/drawingml/2006/diagram" xmlns:r="http://schemas.openxmlformats.org/officeDocument/2006/relationships" r:dm="rId3" r:lo="rId4" r:qs="rId5" r:cs="rId6"/>
+          </a:graphicData>
+        </a:graphic>
+      </p:graphicFrame>
+      <p:sp>
+        <p:nvSpPr>
+          <p:cNvPr id="6" name="Footer Placeholder 5">
+            <a:extLst>
+              <a:ext uri="{FF2B5EF4-FFF2-40B4-BE49-F238E27FC236}">
+                <a16:creationId xmlns:a16="http://schemas.microsoft.com/office/drawing/2014/main" id="{7D77497D-CF2F-4174-96E6-6561B4A875A0}"/>
+              </a:ext>
+            </a:extLst>
+          </p:cNvPr>
+          <p:cNvSpPr>
+            <a:spLocks noGrp="1"/>
+          </p:cNvSpPr>
+          <p:nvPr>
+            <p:ph type="ftr" sz="quarter" idx="11"/>
+          </p:nvPr>
+        </p:nvSpPr>
+        <p:spPr/>
+        <p:txBody>
+          <a:bodyPr>
+            <a:normAutofit/>
+          </a:bodyPr>
+          <a:lstStyle/>
+          <a:p>
+            <a:endParaRPr lang="en-US">
+              <a:solidFill>
+                <a:srgbClr val="FFFFFF"/>
+              </a:solidFill>
+            </a:endParaRPr>
+          </a:p>
+        </p:txBody>
+      </p:sp>
+      <p:sp>
+        <p:nvSpPr>
+          <p:cNvPr id="5" name="Slide Number Placeholder 4">
+            <a:extLst>
+              <a:ext uri="{FF2B5EF4-FFF2-40B4-BE49-F238E27FC236}">
+                <a16:creationId xmlns:a16="http://schemas.microsoft.com/office/drawing/2014/main" id="{05865EF1-885D-4A31-B9FB-273BE5FAB564}"/>
+              </a:ext>
+            </a:extLst>
+          </p:cNvPr>
+          <p:cNvSpPr>
+            <a:spLocks noGrp="1"/>
+          </p:cNvSpPr>
+          <p:nvPr>
+            <p:ph type="sldNum" sz="quarter" idx="12"/>
+          </p:nvPr>
+        </p:nvSpPr>
+        <p:spPr/>
+        <p:txBody>
+          <a:bodyPr>
+            <a:normAutofit/>
+          </a:bodyPr>
+          <a:lstStyle/>
+          <a:p>
+            <a:pPr>
+              <a:spcAft>
+                <a:spcPts val="600"/>
+              </a:spcAft>
+            </a:pPr>
+            <a:fld id="{56FBB80D-BC95-41F9-A723-7C4BDED58279}" type="slidenum">
+              <a:rPr lang="en-US">
+                <a:solidFill>
+                  <a:srgbClr val="FFFFFF"/>
+                </a:solidFill>
+              </a:rPr>
+              <a:pPr>
+                <a:spcAft>
+                  <a:spcPts val="600"/>
+                </a:spcAft>
+              </a:pPr>
+              <a:t>9</a:t>
+            </a:fld>
+            <a:endParaRPr lang="en-US">
+              <a:solidFill>
+                <a:srgbClr val="FFFFFF"/>
+              </a:solidFill>
+            </a:endParaRPr>
+          </a:p>
+        </p:txBody>
+      </p:sp>
     </p:spTree>
     <p:extLst>
       <p:ext uri="{BB962C8B-B14F-4D97-AF65-F5344CB8AC3E}">
-        <p14:creationId xmlns:p14="http://schemas.microsoft.com/office/powerpoint/2010/main" val="3425537333"/>
+        <p14:creationId xmlns:p14="http://schemas.microsoft.com/office/powerpoint/2010/main" val="1603808011"/>
       </p:ext>
     </p:extLst>
   </p:cSld>

</xml_diff>